<commit_message>
Optimizing projections for global minimum
</commit_message>
<xml_diff>
--- a/slides/PQSQ_Results.pptx
+++ b/slides/PQSQ_Results.pptx
@@ -11,6 +11,7 @@
     <p:sldId id="259" r:id="rId5"/>
     <p:sldId id="260" r:id="rId6"/>
     <p:sldId id="261" r:id="rId7"/>
+    <p:sldId id="262" r:id="rId8"/>
   </p:sldIdLst>
   <p:sldSz cx="9144000" cy="6858000" type="screen4x3"/>
   <p:notesSz cx="6858000" cy="9144000"/>
@@ -293,7 +294,7 @@
           <a:p>
             <a:fld id="{66B9327A-1001-4389-85F1-CF39E9360DB2}" type="datetimeFigureOut">
               <a:rPr lang="en-US" smtClean="0"/>
-              <a:t>3/17/2016</a:t>
+              <a:t>3/22/2016</a:t>
             </a:fld>
             <a:endParaRPr lang="en-US"/>
           </a:p>
@@ -463,7 +464,7 @@
           <a:p>
             <a:fld id="{66B9327A-1001-4389-85F1-CF39E9360DB2}" type="datetimeFigureOut">
               <a:rPr lang="en-US" smtClean="0"/>
-              <a:t>3/17/2016</a:t>
+              <a:t>3/22/2016</a:t>
             </a:fld>
             <a:endParaRPr lang="en-US"/>
           </a:p>
@@ -643,7 +644,7 @@
           <a:p>
             <a:fld id="{66B9327A-1001-4389-85F1-CF39E9360DB2}" type="datetimeFigureOut">
               <a:rPr lang="en-US" smtClean="0"/>
-              <a:t>3/17/2016</a:t>
+              <a:t>3/22/2016</a:t>
             </a:fld>
             <a:endParaRPr lang="en-US"/>
           </a:p>
@@ -813,7 +814,7 @@
           <a:p>
             <a:fld id="{66B9327A-1001-4389-85F1-CF39E9360DB2}" type="datetimeFigureOut">
               <a:rPr lang="en-US" smtClean="0"/>
-              <a:t>3/17/2016</a:t>
+              <a:t>3/22/2016</a:t>
             </a:fld>
             <a:endParaRPr lang="en-US"/>
           </a:p>
@@ -1059,7 +1060,7 @@
           <a:p>
             <a:fld id="{66B9327A-1001-4389-85F1-CF39E9360DB2}" type="datetimeFigureOut">
               <a:rPr lang="en-US" smtClean="0"/>
-              <a:t>3/17/2016</a:t>
+              <a:t>3/22/2016</a:t>
             </a:fld>
             <a:endParaRPr lang="en-US"/>
           </a:p>
@@ -1347,7 +1348,7 @@
           <a:p>
             <a:fld id="{66B9327A-1001-4389-85F1-CF39E9360DB2}" type="datetimeFigureOut">
               <a:rPr lang="en-US" smtClean="0"/>
-              <a:t>3/17/2016</a:t>
+              <a:t>3/22/2016</a:t>
             </a:fld>
             <a:endParaRPr lang="en-US"/>
           </a:p>
@@ -1769,7 +1770,7 @@
           <a:p>
             <a:fld id="{66B9327A-1001-4389-85F1-CF39E9360DB2}" type="datetimeFigureOut">
               <a:rPr lang="en-US" smtClean="0"/>
-              <a:t>3/17/2016</a:t>
+              <a:t>3/22/2016</a:t>
             </a:fld>
             <a:endParaRPr lang="en-US"/>
           </a:p>
@@ -1887,7 +1888,7 @@
           <a:p>
             <a:fld id="{66B9327A-1001-4389-85F1-CF39E9360DB2}" type="datetimeFigureOut">
               <a:rPr lang="en-US" smtClean="0"/>
-              <a:t>3/17/2016</a:t>
+              <a:t>3/22/2016</a:t>
             </a:fld>
             <a:endParaRPr lang="en-US"/>
           </a:p>
@@ -1982,7 +1983,7 @@
           <a:p>
             <a:fld id="{66B9327A-1001-4389-85F1-CF39E9360DB2}" type="datetimeFigureOut">
               <a:rPr lang="en-US" smtClean="0"/>
-              <a:t>3/17/2016</a:t>
+              <a:t>3/22/2016</a:t>
             </a:fld>
             <a:endParaRPr lang="en-US"/>
           </a:p>
@@ -2259,7 +2260,7 @@
           <a:p>
             <a:fld id="{66B9327A-1001-4389-85F1-CF39E9360DB2}" type="datetimeFigureOut">
               <a:rPr lang="en-US" smtClean="0"/>
-              <a:t>3/17/2016</a:t>
+              <a:t>3/22/2016</a:t>
             </a:fld>
             <a:endParaRPr lang="en-US"/>
           </a:p>
@@ -2512,7 +2513,7 @@
           <a:p>
             <a:fld id="{66B9327A-1001-4389-85F1-CF39E9360DB2}" type="datetimeFigureOut">
               <a:rPr lang="en-US" smtClean="0"/>
-              <a:t>3/17/2016</a:t>
+              <a:t>3/22/2016</a:t>
             </a:fld>
             <a:endParaRPr lang="en-US"/>
           </a:p>
@@ -2725,7 +2726,7 @@
           <a:p>
             <a:fld id="{66B9327A-1001-4389-85F1-CF39E9360DB2}" type="datetimeFigureOut">
               <a:rPr lang="en-US" smtClean="0"/>
-              <a:t>3/17/2016</a:t>
+              <a:t>3/22/2016</a:t>
             </a:fld>
             <a:endParaRPr lang="en-US"/>
           </a:p>
@@ -5247,6 +5248,784 @@
     <p:extLst>
       <p:ext uri="{BB962C8B-B14F-4D97-AF65-F5344CB8AC3E}">
         <p14:creationId xmlns:p14="http://schemas.microsoft.com/office/powerpoint/2010/main" val="3279022136"/>
+      </p:ext>
+    </p:extLst>
+  </p:cSld>
+  <p:clrMapOvr>
+    <a:masterClrMapping/>
+  </p:clrMapOvr>
+  <p:timing>
+    <p:tnLst>
+      <p:par>
+        <p:cTn id="1" dur="indefinite" restart="never" nodeType="tmRoot"/>
+      </p:par>
+    </p:tnLst>
+  </p:timing>
+</p:sld>
+</file>
+
+<file path=ppt/slides/slide7.xml><?xml version="1.0" encoding="utf-8"?>
+<p:sld xmlns:a="http://schemas.openxmlformats.org/drawingml/2006/main" xmlns:r="http://schemas.openxmlformats.org/officeDocument/2006/relationships" xmlns:p="http://schemas.openxmlformats.org/presentationml/2006/main">
+  <p:cSld>
+    <p:spTree>
+      <p:nvGrpSpPr>
+        <p:cNvPr id="1" name=""/>
+        <p:cNvGrpSpPr/>
+        <p:nvPr/>
+      </p:nvGrpSpPr>
+      <p:grpSpPr>
+        <a:xfrm>
+          <a:off x="0" y="0"/>
+          <a:ext cx="0" cy="0"/>
+          <a:chOff x="0" y="0"/>
+          <a:chExt cx="0" cy="0"/>
+        </a:xfrm>
+      </p:grpSpPr>
+      <p:pic>
+        <p:nvPicPr>
+          <p:cNvPr id="1031" name="Picture 7"/>
+          <p:cNvPicPr>
+            <a:picLocks noChangeAspect="1" noChangeArrowheads="1"/>
+          </p:cNvPicPr>
+          <p:nvPr/>
+        </p:nvPicPr>
+        <p:blipFill>
+          <a:blip r:embed="rId2" cstate="print">
+            <a:extLst>
+              <a:ext uri="{28A0092B-C50C-407E-A947-70E740481C1C}">
+                <a14:useLocalDpi xmlns:a14="http://schemas.microsoft.com/office/drawing/2010/main" val="0"/>
+              </a:ext>
+            </a:extLst>
+          </a:blip>
+          <a:srcRect/>
+          <a:stretch>
+            <a:fillRect/>
+          </a:stretch>
+        </p:blipFill>
+        <p:spPr bwMode="auto">
+          <a:xfrm>
+            <a:off x="228600" y="4863711"/>
+            <a:ext cx="2151496" cy="1613289"/>
+          </a:xfrm>
+          <a:prstGeom prst="rect">
+            <a:avLst/>
+          </a:prstGeom>
+          <a:noFill/>
+          <a:ln>
+            <a:noFill/>
+          </a:ln>
+          <a:effectLst/>
+          <a:extLst>
+            <a:ext uri="{909E8E84-426E-40DD-AFC4-6F175D3DCCD1}">
+              <a14:hiddenFill xmlns:a14="http://schemas.microsoft.com/office/drawing/2010/main">
+                <a:solidFill>
+                  <a:schemeClr val="accent1"/>
+                </a:solidFill>
+              </a14:hiddenFill>
+            </a:ext>
+            <a:ext uri="{91240B29-F687-4F45-9708-019B960494DF}">
+              <a14:hiddenLine xmlns:a14="http://schemas.microsoft.com/office/drawing/2010/main" w="9525">
+                <a:solidFill>
+                  <a:schemeClr val="tx1"/>
+                </a:solidFill>
+                <a:miter lim="800000"/>
+                <a:headEnd/>
+                <a:tailEnd/>
+              </a14:hiddenLine>
+            </a:ext>
+            <a:ext uri="{AF507438-7753-43E0-B8FC-AC1667EBCBE1}">
+              <a14:hiddenEffects xmlns:a14="http://schemas.microsoft.com/office/drawing/2010/main">
+                <a:effectLst>
+                  <a:outerShdw dist="35921" dir="2700000" algn="ctr" rotWithShape="0">
+                    <a:schemeClr val="bg2"/>
+                  </a:outerShdw>
+                </a:effectLst>
+              </a14:hiddenEffects>
+            </a:ext>
+          </a:extLst>
+        </p:spPr>
+      </p:pic>
+      <p:pic>
+        <p:nvPicPr>
+          <p:cNvPr id="1030" name="Picture 6"/>
+          <p:cNvPicPr>
+            <a:picLocks noChangeAspect="1" noChangeArrowheads="1"/>
+          </p:cNvPicPr>
+          <p:nvPr/>
+        </p:nvPicPr>
+        <p:blipFill>
+          <a:blip r:embed="rId3" cstate="print">
+            <a:extLst>
+              <a:ext uri="{28A0092B-C50C-407E-A947-70E740481C1C}">
+                <a14:useLocalDpi xmlns:a14="http://schemas.microsoft.com/office/drawing/2010/main" val="0"/>
+              </a:ext>
+            </a:extLst>
+          </a:blip>
+          <a:srcRect/>
+          <a:stretch>
+            <a:fillRect/>
+          </a:stretch>
+        </p:blipFill>
+        <p:spPr bwMode="auto">
+          <a:xfrm>
+            <a:off x="2286067" y="4863403"/>
+            <a:ext cx="2066384" cy="1549468"/>
+          </a:xfrm>
+          <a:prstGeom prst="rect">
+            <a:avLst/>
+          </a:prstGeom>
+          <a:noFill/>
+          <a:ln>
+            <a:noFill/>
+          </a:ln>
+          <a:effectLst/>
+          <a:extLst>
+            <a:ext uri="{909E8E84-426E-40DD-AFC4-6F175D3DCCD1}">
+              <a14:hiddenFill xmlns:a14="http://schemas.microsoft.com/office/drawing/2010/main">
+                <a:solidFill>
+                  <a:schemeClr val="accent1"/>
+                </a:solidFill>
+              </a14:hiddenFill>
+            </a:ext>
+            <a:ext uri="{91240B29-F687-4F45-9708-019B960494DF}">
+              <a14:hiddenLine xmlns:a14="http://schemas.microsoft.com/office/drawing/2010/main" w="9525">
+                <a:solidFill>
+                  <a:schemeClr val="tx1"/>
+                </a:solidFill>
+                <a:miter lim="800000"/>
+                <a:headEnd/>
+                <a:tailEnd/>
+              </a14:hiddenLine>
+            </a:ext>
+            <a:ext uri="{AF507438-7753-43E0-B8FC-AC1667EBCBE1}">
+              <a14:hiddenEffects xmlns:a14="http://schemas.microsoft.com/office/drawing/2010/main">
+                <a:effectLst>
+                  <a:outerShdw dist="35921" dir="2700000" algn="ctr" rotWithShape="0">
+                    <a:schemeClr val="bg2"/>
+                  </a:outerShdw>
+                </a:effectLst>
+              </a14:hiddenEffects>
+            </a:ext>
+          </a:extLst>
+        </p:spPr>
+      </p:pic>
+      <p:sp>
+        <p:nvSpPr>
+          <p:cNvPr id="2" name="Title 1"/>
+          <p:cNvSpPr>
+            <a:spLocks noGrp="1"/>
+          </p:cNvSpPr>
+          <p:nvPr>
+            <p:ph type="title"/>
+          </p:nvPr>
+        </p:nvSpPr>
+        <p:spPr/>
+        <p:txBody>
+          <a:bodyPr/>
+          <a:lstStyle/>
+          <a:p>
+            <a:r>
+              <a:rPr lang="en-US" dirty="0" smtClean="0"/>
+              <a:t>Effect of projection optimization</a:t>
+            </a:r>
+            <a:endParaRPr lang="en-US" dirty="0"/>
+          </a:p>
+        </p:txBody>
+      </p:sp>
+      <p:pic>
+        <p:nvPicPr>
+          <p:cNvPr id="1026" name="Picture 2"/>
+          <p:cNvPicPr>
+            <a:picLocks noChangeAspect="1" noChangeArrowheads="1"/>
+          </p:cNvPicPr>
+          <p:nvPr/>
+        </p:nvPicPr>
+        <p:blipFill>
+          <a:blip r:embed="rId4">
+            <a:extLst>
+              <a:ext uri="{28A0092B-C50C-407E-A947-70E740481C1C}">
+                <a14:useLocalDpi xmlns:a14="http://schemas.microsoft.com/office/drawing/2010/main" val="0"/>
+              </a:ext>
+            </a:extLst>
+          </a:blip>
+          <a:srcRect/>
+          <a:stretch>
+            <a:fillRect/>
+          </a:stretch>
+        </p:blipFill>
+        <p:spPr bwMode="auto">
+          <a:xfrm>
+            <a:off x="27161" y="1905000"/>
+            <a:ext cx="4050586" cy="3037312"/>
+          </a:xfrm>
+          <a:prstGeom prst="rect">
+            <a:avLst/>
+          </a:prstGeom>
+          <a:noFill/>
+          <a:ln>
+            <a:noFill/>
+          </a:ln>
+          <a:effectLst/>
+          <a:extLst>
+            <a:ext uri="{909E8E84-426E-40DD-AFC4-6F175D3DCCD1}">
+              <a14:hiddenFill xmlns:a14="http://schemas.microsoft.com/office/drawing/2010/main">
+                <a:solidFill>
+                  <a:schemeClr val="accent1"/>
+                </a:solidFill>
+              </a14:hiddenFill>
+            </a:ext>
+            <a:ext uri="{91240B29-F687-4F45-9708-019B960494DF}">
+              <a14:hiddenLine xmlns:a14="http://schemas.microsoft.com/office/drawing/2010/main" w="9525">
+                <a:solidFill>
+                  <a:schemeClr val="tx1"/>
+                </a:solidFill>
+                <a:miter lim="800000"/>
+                <a:headEnd/>
+                <a:tailEnd/>
+              </a14:hiddenLine>
+            </a:ext>
+            <a:ext uri="{AF507438-7753-43E0-B8FC-AC1667EBCBE1}">
+              <a14:hiddenEffects xmlns:a14="http://schemas.microsoft.com/office/drawing/2010/main">
+                <a:effectLst>
+                  <a:outerShdw dist="35921" dir="2700000" algn="ctr" rotWithShape="0">
+                    <a:schemeClr val="bg2"/>
+                  </a:outerShdw>
+                </a:effectLst>
+              </a14:hiddenEffects>
+            </a:ext>
+          </a:extLst>
+        </p:spPr>
+      </p:pic>
+      <p:sp>
+        <p:nvSpPr>
+          <p:cNvPr id="4" name="TextBox 3"/>
+          <p:cNvSpPr txBox="1"/>
+          <p:nvPr/>
+        </p:nvSpPr>
+        <p:spPr>
+          <a:xfrm>
+            <a:off x="975364" y="1676400"/>
+            <a:ext cx="2154179" cy="369332"/>
+          </a:xfrm>
+          <a:prstGeom prst="rect">
+            <a:avLst/>
+          </a:prstGeom>
+          <a:noFill/>
+        </p:spPr>
+        <p:txBody>
+          <a:bodyPr wrap="none" rtlCol="0">
+            <a:spAutoFit/>
+          </a:bodyPr>
+          <a:lstStyle/>
+          <a:p>
+            <a:r>
+              <a:rPr lang="en-US" dirty="0" smtClean="0"/>
+              <a:t>without optimization</a:t>
+            </a:r>
+            <a:endParaRPr lang="en-US" dirty="0"/>
+          </a:p>
+        </p:txBody>
+      </p:sp>
+      <p:sp>
+        <p:nvSpPr>
+          <p:cNvPr id="5" name="TextBox 4"/>
+          <p:cNvSpPr txBox="1"/>
+          <p:nvPr/>
+        </p:nvSpPr>
+        <p:spPr>
+          <a:xfrm>
+            <a:off x="615636" y="1155247"/>
+            <a:ext cx="3819122" cy="369332"/>
+          </a:xfrm>
+          <a:prstGeom prst="rect">
+            <a:avLst/>
+          </a:prstGeom>
+          <a:noFill/>
+        </p:spPr>
+        <p:txBody>
+          <a:bodyPr wrap="none" rtlCol="0">
+            <a:spAutoFit/>
+          </a:bodyPr>
+          <a:lstStyle/>
+          <a:p>
+            <a:r>
+              <a:rPr lang="en-US" dirty="0" err="1" smtClean="0"/>
+              <a:t>Housing_scaled</a:t>
+            </a:r>
+            <a:r>
+              <a:rPr lang="en-US" dirty="0" smtClean="0"/>
+              <a:t> dataset, n intervals = 5</a:t>
+            </a:r>
+            <a:endParaRPr lang="en-US" dirty="0"/>
+          </a:p>
+        </p:txBody>
+      </p:sp>
+      <p:sp>
+        <p:nvSpPr>
+          <p:cNvPr id="7" name="TextBox 6"/>
+          <p:cNvSpPr txBox="1"/>
+          <p:nvPr/>
+        </p:nvSpPr>
+        <p:spPr>
+          <a:xfrm>
+            <a:off x="5868855" y="1535668"/>
+            <a:ext cx="1833579" cy="369332"/>
+          </a:xfrm>
+          <a:prstGeom prst="rect">
+            <a:avLst/>
+          </a:prstGeom>
+          <a:noFill/>
+        </p:spPr>
+        <p:txBody>
+          <a:bodyPr wrap="none" rtlCol="0">
+            <a:spAutoFit/>
+          </a:bodyPr>
+          <a:lstStyle/>
+          <a:p>
+            <a:r>
+              <a:rPr lang="en-US" dirty="0" smtClean="0"/>
+              <a:t>with optimization</a:t>
+            </a:r>
+            <a:endParaRPr lang="en-US" dirty="0"/>
+          </a:p>
+        </p:txBody>
+      </p:sp>
+      <p:pic>
+        <p:nvPicPr>
+          <p:cNvPr id="1027" name="Picture 3"/>
+          <p:cNvPicPr>
+            <a:picLocks noChangeAspect="1" noChangeArrowheads="1"/>
+          </p:cNvPicPr>
+          <p:nvPr/>
+        </p:nvPicPr>
+        <p:blipFill>
+          <a:blip r:embed="rId5">
+            <a:extLst>
+              <a:ext uri="{28A0092B-C50C-407E-A947-70E740481C1C}">
+                <a14:useLocalDpi xmlns:a14="http://schemas.microsoft.com/office/drawing/2010/main" val="0"/>
+              </a:ext>
+            </a:extLst>
+          </a:blip>
+          <a:srcRect/>
+          <a:stretch>
+            <a:fillRect/>
+          </a:stretch>
+        </p:blipFill>
+        <p:spPr bwMode="auto">
+          <a:xfrm>
+            <a:off x="4819526" y="1894438"/>
+            <a:ext cx="3932237" cy="2948569"/>
+          </a:xfrm>
+          <a:prstGeom prst="rect">
+            <a:avLst/>
+          </a:prstGeom>
+          <a:noFill/>
+          <a:ln>
+            <a:noFill/>
+          </a:ln>
+          <a:effectLst/>
+          <a:extLst>
+            <a:ext uri="{909E8E84-426E-40DD-AFC4-6F175D3DCCD1}">
+              <a14:hiddenFill xmlns:a14="http://schemas.microsoft.com/office/drawing/2010/main">
+                <a:solidFill>
+                  <a:schemeClr val="accent1"/>
+                </a:solidFill>
+              </a14:hiddenFill>
+            </a:ext>
+            <a:ext uri="{91240B29-F687-4F45-9708-019B960494DF}">
+              <a14:hiddenLine xmlns:a14="http://schemas.microsoft.com/office/drawing/2010/main" w="9525">
+                <a:solidFill>
+                  <a:schemeClr val="tx1"/>
+                </a:solidFill>
+                <a:miter lim="800000"/>
+                <a:headEnd/>
+                <a:tailEnd/>
+              </a14:hiddenLine>
+            </a:ext>
+            <a:ext uri="{AF507438-7753-43E0-B8FC-AC1667EBCBE1}">
+              <a14:hiddenEffects xmlns:a14="http://schemas.microsoft.com/office/drawing/2010/main">
+                <a:effectLst>
+                  <a:outerShdw dist="35921" dir="2700000" algn="ctr" rotWithShape="0">
+                    <a:schemeClr val="bg2"/>
+                  </a:outerShdw>
+                </a:effectLst>
+              </a14:hiddenEffects>
+            </a:ext>
+          </a:extLst>
+        </p:spPr>
+      </p:pic>
+      <p:pic>
+        <p:nvPicPr>
+          <p:cNvPr id="1028" name="Picture 4"/>
+          <p:cNvPicPr>
+            <a:picLocks noChangeAspect="1" noChangeArrowheads="1"/>
+          </p:cNvPicPr>
+          <p:nvPr/>
+        </p:nvPicPr>
+        <p:blipFill>
+          <a:blip r:embed="rId6" cstate="print">
+            <a:extLst>
+              <a:ext uri="{28A0092B-C50C-407E-A947-70E740481C1C}">
+                <a14:useLocalDpi xmlns:a14="http://schemas.microsoft.com/office/drawing/2010/main" val="0"/>
+              </a:ext>
+            </a:extLst>
+          </a:blip>
+          <a:srcRect/>
+          <a:stretch>
+            <a:fillRect/>
+          </a:stretch>
+        </p:blipFill>
+        <p:spPr bwMode="auto">
+          <a:xfrm>
+            <a:off x="4880665" y="4906853"/>
+            <a:ext cx="2171293" cy="1628133"/>
+          </a:xfrm>
+          <a:prstGeom prst="rect">
+            <a:avLst/>
+          </a:prstGeom>
+          <a:noFill/>
+          <a:ln>
+            <a:noFill/>
+          </a:ln>
+          <a:effectLst/>
+          <a:extLst>
+            <a:ext uri="{909E8E84-426E-40DD-AFC4-6F175D3DCCD1}">
+              <a14:hiddenFill xmlns:a14="http://schemas.microsoft.com/office/drawing/2010/main">
+                <a:solidFill>
+                  <a:schemeClr val="accent1"/>
+                </a:solidFill>
+              </a14:hiddenFill>
+            </a:ext>
+            <a:ext uri="{91240B29-F687-4F45-9708-019B960494DF}">
+              <a14:hiddenLine xmlns:a14="http://schemas.microsoft.com/office/drawing/2010/main" w="9525">
+                <a:solidFill>
+                  <a:schemeClr val="tx1"/>
+                </a:solidFill>
+                <a:miter lim="800000"/>
+                <a:headEnd/>
+                <a:tailEnd/>
+              </a14:hiddenLine>
+            </a:ext>
+            <a:ext uri="{AF507438-7753-43E0-B8FC-AC1667EBCBE1}">
+              <a14:hiddenEffects xmlns:a14="http://schemas.microsoft.com/office/drawing/2010/main">
+                <a:effectLst>
+                  <a:outerShdw dist="35921" dir="2700000" algn="ctr" rotWithShape="0">
+                    <a:schemeClr val="bg2"/>
+                  </a:outerShdw>
+                </a:effectLst>
+              </a14:hiddenEffects>
+            </a:ext>
+          </a:extLst>
+        </p:spPr>
+      </p:pic>
+      <p:pic>
+        <p:nvPicPr>
+          <p:cNvPr id="1029" name="Picture 5"/>
+          <p:cNvPicPr>
+            <a:picLocks noChangeAspect="1" noChangeArrowheads="1"/>
+          </p:cNvPicPr>
+          <p:nvPr/>
+        </p:nvPicPr>
+        <p:blipFill>
+          <a:blip r:embed="rId7" cstate="print">
+            <a:extLst>
+              <a:ext uri="{28A0092B-C50C-407E-A947-70E740481C1C}">
+                <a14:useLocalDpi xmlns:a14="http://schemas.microsoft.com/office/drawing/2010/main" val="0"/>
+              </a:ext>
+            </a:extLst>
+          </a:blip>
+          <a:srcRect/>
+          <a:stretch>
+            <a:fillRect/>
+          </a:stretch>
+        </p:blipFill>
+        <p:spPr bwMode="auto">
+          <a:xfrm>
+            <a:off x="6925216" y="4932504"/>
+            <a:ext cx="2066384" cy="1549468"/>
+          </a:xfrm>
+          <a:prstGeom prst="rect">
+            <a:avLst/>
+          </a:prstGeom>
+          <a:noFill/>
+          <a:ln>
+            <a:noFill/>
+          </a:ln>
+          <a:effectLst/>
+          <a:extLst>
+            <a:ext uri="{909E8E84-426E-40DD-AFC4-6F175D3DCCD1}">
+              <a14:hiddenFill xmlns:a14="http://schemas.microsoft.com/office/drawing/2010/main">
+                <a:solidFill>
+                  <a:schemeClr val="accent1"/>
+                </a:solidFill>
+              </a14:hiddenFill>
+            </a:ext>
+            <a:ext uri="{91240B29-F687-4F45-9708-019B960494DF}">
+              <a14:hiddenLine xmlns:a14="http://schemas.microsoft.com/office/drawing/2010/main" w="9525">
+                <a:solidFill>
+                  <a:schemeClr val="tx1"/>
+                </a:solidFill>
+                <a:miter lim="800000"/>
+                <a:headEnd/>
+                <a:tailEnd/>
+              </a14:hiddenLine>
+            </a:ext>
+            <a:ext uri="{AF507438-7753-43E0-B8FC-AC1667EBCBE1}">
+              <a14:hiddenEffects xmlns:a14="http://schemas.microsoft.com/office/drawing/2010/main">
+                <a:effectLst>
+                  <a:outerShdw dist="35921" dir="2700000" algn="ctr" rotWithShape="0">
+                    <a:schemeClr val="bg2"/>
+                  </a:outerShdw>
+                </a:effectLst>
+              </a14:hiddenEffects>
+            </a:ext>
+          </a:extLst>
+        </p:spPr>
+      </p:pic>
+      <p:sp>
+        <p:nvSpPr>
+          <p:cNvPr id="6" name="TextBox 5"/>
+          <p:cNvSpPr txBox="1"/>
+          <p:nvPr/>
+        </p:nvSpPr>
+        <p:spPr>
+          <a:xfrm>
+            <a:off x="7852875" y="6350320"/>
+            <a:ext cx="332142" cy="369332"/>
+          </a:xfrm>
+          <a:prstGeom prst="rect">
+            <a:avLst/>
+          </a:prstGeom>
+          <a:noFill/>
+        </p:spPr>
+        <p:txBody>
+          <a:bodyPr wrap="none" rtlCol="0">
+            <a:spAutoFit/>
+          </a:bodyPr>
+          <a:lstStyle/>
+          <a:p>
+            <a:r>
+              <a:rPr lang="en-US" dirty="0" smtClean="0"/>
+              <a:t>U</a:t>
+            </a:r>
+            <a:endParaRPr lang="en-US" dirty="0"/>
+          </a:p>
+        </p:txBody>
+      </p:sp>
+      <p:sp>
+        <p:nvSpPr>
+          <p:cNvPr id="12" name="TextBox 11"/>
+          <p:cNvSpPr txBox="1"/>
+          <p:nvPr/>
+        </p:nvSpPr>
+        <p:spPr>
+          <a:xfrm rot="16200000">
+            <a:off x="6518931" y="5420762"/>
+            <a:ext cx="1055161" cy="369332"/>
+          </a:xfrm>
+          <a:prstGeom prst="rect">
+            <a:avLst/>
+          </a:prstGeom>
+          <a:noFill/>
+        </p:spPr>
+        <p:txBody>
+          <a:bodyPr wrap="none" rtlCol="0">
+            <a:spAutoFit/>
+          </a:bodyPr>
+          <a:lstStyle/>
+          <a:p>
+            <a:r>
+              <a:rPr lang="en-US" dirty="0" smtClean="0"/>
+              <a:t>argminL1</a:t>
+            </a:r>
+            <a:endParaRPr lang="en-US" dirty="0"/>
+          </a:p>
+        </p:txBody>
+      </p:sp>
+      <p:sp>
+        <p:nvSpPr>
+          <p:cNvPr id="13" name="TextBox 12"/>
+          <p:cNvSpPr txBox="1"/>
+          <p:nvPr/>
+        </p:nvSpPr>
+        <p:spPr>
+          <a:xfrm rot="16200000">
+            <a:off x="4217631" y="5553099"/>
+            <a:ext cx="1326069" cy="369332"/>
+          </a:xfrm>
+          <a:prstGeom prst="rect">
+            <a:avLst/>
+          </a:prstGeom>
+          <a:noFill/>
+        </p:spPr>
+        <p:txBody>
+          <a:bodyPr wrap="none" rtlCol="0">
+            <a:spAutoFit/>
+          </a:bodyPr>
+          <a:lstStyle/>
+          <a:p>
+            <a:r>
+              <a:rPr lang="en-US" dirty="0" smtClean="0"/>
+              <a:t>U- argminL2</a:t>
+            </a:r>
+            <a:endParaRPr lang="en-US" dirty="0"/>
+          </a:p>
+        </p:txBody>
+      </p:sp>
+      <p:sp>
+        <p:nvSpPr>
+          <p:cNvPr id="14" name="TextBox 13"/>
+          <p:cNvSpPr txBox="1"/>
+          <p:nvPr/>
+        </p:nvSpPr>
+        <p:spPr>
+          <a:xfrm>
+            <a:off x="5438731" y="6388257"/>
+            <a:ext cx="1378967" cy="369332"/>
+          </a:xfrm>
+          <a:prstGeom prst="rect">
+            <a:avLst/>
+          </a:prstGeom>
+          <a:noFill/>
+        </p:spPr>
+        <p:txBody>
+          <a:bodyPr wrap="none" rtlCol="0">
+            <a:spAutoFit/>
+          </a:bodyPr>
+          <a:lstStyle/>
+          <a:p>
+            <a:r>
+              <a:rPr lang="en-US" dirty="0" smtClean="0"/>
+              <a:t>U - argminL1</a:t>
+            </a:r>
+            <a:endParaRPr lang="en-US" dirty="0"/>
+          </a:p>
+        </p:txBody>
+      </p:sp>
+      <p:sp>
+        <p:nvSpPr>
+          <p:cNvPr id="17" name="TextBox 16"/>
+          <p:cNvSpPr txBox="1"/>
+          <p:nvPr/>
+        </p:nvSpPr>
+        <p:spPr>
+          <a:xfrm>
+            <a:off x="3153188" y="6297306"/>
+            <a:ext cx="332142" cy="369332"/>
+          </a:xfrm>
+          <a:prstGeom prst="rect">
+            <a:avLst/>
+          </a:prstGeom>
+          <a:noFill/>
+        </p:spPr>
+        <p:txBody>
+          <a:bodyPr wrap="none" rtlCol="0">
+            <a:spAutoFit/>
+          </a:bodyPr>
+          <a:lstStyle/>
+          <a:p>
+            <a:r>
+              <a:rPr lang="en-US" dirty="0" smtClean="0"/>
+              <a:t>U</a:t>
+            </a:r>
+            <a:endParaRPr lang="en-US" dirty="0"/>
+          </a:p>
+        </p:txBody>
+      </p:sp>
+      <p:sp>
+        <p:nvSpPr>
+          <p:cNvPr id="18" name="TextBox 17"/>
+          <p:cNvSpPr txBox="1"/>
+          <p:nvPr/>
+        </p:nvSpPr>
+        <p:spPr>
+          <a:xfrm rot="16200000">
+            <a:off x="1819244" y="5367748"/>
+            <a:ext cx="1055161" cy="369332"/>
+          </a:xfrm>
+          <a:prstGeom prst="rect">
+            <a:avLst/>
+          </a:prstGeom>
+          <a:noFill/>
+        </p:spPr>
+        <p:txBody>
+          <a:bodyPr wrap="none" rtlCol="0">
+            <a:spAutoFit/>
+          </a:bodyPr>
+          <a:lstStyle/>
+          <a:p>
+            <a:r>
+              <a:rPr lang="en-US" dirty="0" smtClean="0"/>
+              <a:t>argminL1</a:t>
+            </a:r>
+            <a:endParaRPr lang="en-US" dirty="0"/>
+          </a:p>
+        </p:txBody>
+      </p:sp>
+      <p:sp>
+        <p:nvSpPr>
+          <p:cNvPr id="19" name="TextBox 18"/>
+          <p:cNvSpPr txBox="1"/>
+          <p:nvPr/>
+        </p:nvSpPr>
+        <p:spPr>
+          <a:xfrm rot="16200000">
+            <a:off x="-454897" y="5500085"/>
+            <a:ext cx="1326069" cy="369332"/>
+          </a:xfrm>
+          <a:prstGeom prst="rect">
+            <a:avLst/>
+          </a:prstGeom>
+          <a:noFill/>
+        </p:spPr>
+        <p:txBody>
+          <a:bodyPr wrap="none" rtlCol="0">
+            <a:spAutoFit/>
+          </a:bodyPr>
+          <a:lstStyle/>
+          <a:p>
+            <a:r>
+              <a:rPr lang="en-US" dirty="0" smtClean="0"/>
+              <a:t>U- argminL2</a:t>
+            </a:r>
+            <a:endParaRPr lang="en-US" dirty="0"/>
+          </a:p>
+        </p:txBody>
+      </p:sp>
+      <p:sp>
+        <p:nvSpPr>
+          <p:cNvPr id="20" name="TextBox 19"/>
+          <p:cNvSpPr txBox="1"/>
+          <p:nvPr/>
+        </p:nvSpPr>
+        <p:spPr>
+          <a:xfrm>
+            <a:off x="766203" y="6335243"/>
+            <a:ext cx="1378967" cy="369332"/>
+          </a:xfrm>
+          <a:prstGeom prst="rect">
+            <a:avLst/>
+          </a:prstGeom>
+          <a:noFill/>
+        </p:spPr>
+        <p:txBody>
+          <a:bodyPr wrap="none" rtlCol="0">
+            <a:spAutoFit/>
+          </a:bodyPr>
+          <a:lstStyle/>
+          <a:p>
+            <a:r>
+              <a:rPr lang="en-US" dirty="0" smtClean="0"/>
+              <a:t>U - argminL1</a:t>
+            </a:r>
+            <a:endParaRPr lang="en-US" dirty="0"/>
+          </a:p>
+        </p:txBody>
+      </p:sp>
+    </p:spTree>
+    <p:extLst>
+      <p:ext uri="{BB962C8B-B14F-4D97-AF65-F5344CB8AC3E}">
+        <p14:creationId xmlns:p14="http://schemas.microsoft.com/office/powerpoint/2010/main" val="3758003924"/>
       </p:ext>
     </p:extLst>
   </p:cSld>

</xml_diff>